<commit_message>
Implemented Laplace of Gaussian filter.
</commit_message>
<xml_diff>
--- a/Documents/295 AGV sensor Fusion.pptx
+++ b/Documents/295 AGV sensor Fusion.pptx
@@ -5,7 +5,7 @@
     <p:sldMasterId id="2147483659" r:id="rId1"/>
   </p:sldMasterIdLst>
   <p:notesMasterIdLst>
-    <p:notesMasterId r:id="rId13"/>
+    <p:notesMasterId r:id="rId14"/>
   </p:notesMasterIdLst>
   <p:sldIdLst>
     <p:sldId id="256" r:id="rId2"/>
@@ -18,7 +18,8 @@
     <p:sldId id="261" r:id="rId9"/>
     <p:sldId id="262" r:id="rId10"/>
     <p:sldId id="263" r:id="rId11"/>
-    <p:sldId id="270" r:id="rId12"/>
+    <p:sldId id="273" r:id="rId12"/>
+    <p:sldId id="270" r:id="rId13"/>
   </p:sldIdLst>
   <p:sldSz cx="9144000" cy="5943600"/>
   <p:notesSz cx="6858000" cy="9144000"/>
@@ -226,7 +227,7 @@
   </p:defaultTextStyle>
   <p:extLst>
     <p:ext uri="{EFAFB233-063F-42B5-8137-9DF3F51BA10A}">
-      <p15:sldGuideLst xmlns:p15="http://schemas.microsoft.com/office/powerpoint/2012/main"/>
+      <p15:sldGuideLst xmlns:p15="http://schemas.microsoft.com/office/powerpoint/2012/main" xmlns=""/>
     </p:ext>
   </p:extLst>
 </p:presentation>
@@ -1517,6 +1518,151 @@
             <a:fld id="{00000000-1234-1234-1234-123412341234}" type="slidenum">
               <a:rPr lang="en-US"/>
               <a:t>11</a:t>
+            </a:fld>
+            <a:endParaRPr lang="en-US"/>
+          </a:p>
+        </p:txBody>
+      </p:sp>
+    </p:spTree>
+    <p:extLst>
+      <p:ext uri="{BB962C8B-B14F-4D97-AF65-F5344CB8AC3E}">
+        <p14:creationId xmlns:p14="http://schemas.microsoft.com/office/powerpoint/2010/main" val="615456620"/>
+      </p:ext>
+    </p:extLst>
+  </p:cSld>
+  <p:clrMapOvr>
+    <a:masterClrMapping/>
+  </p:clrMapOvr>
+</p:notes>
+</file>
+
+<file path=ppt/notesSlides/notesSlide12.xml><?xml version="1.0" encoding="utf-8"?>
+<p:notes xmlns:a="http://schemas.openxmlformats.org/drawingml/2006/main" xmlns:r="http://schemas.openxmlformats.org/officeDocument/2006/relationships" xmlns:p="http://schemas.openxmlformats.org/presentationml/2006/main" showMasterSp="0" showMasterPhAnim="0">
+  <p:cSld>
+    <p:spTree>
+      <p:nvGrpSpPr>
+        <p:cNvPr id="1" name="Shape 108"/>
+        <p:cNvGrpSpPr/>
+        <p:nvPr/>
+      </p:nvGrpSpPr>
+      <p:grpSpPr>
+        <a:xfrm>
+          <a:off x="0" y="0"/>
+          <a:ext cx="0" cy="0"/>
+          <a:chOff x="0" y="0"/>
+          <a:chExt cx="0" cy="0"/>
+        </a:xfrm>
+      </p:grpSpPr>
+      <p:sp>
+        <p:nvSpPr>
+          <p:cNvPr id="109" name="Shape 109"/>
+          <p:cNvSpPr>
+            <a:spLocks noGrp="1" noRot="1" noChangeAspect="1"/>
+          </p:cNvSpPr>
+          <p:nvPr>
+            <p:ph type="sldImg" idx="2"/>
+          </p:nvPr>
+        </p:nvSpPr>
+        <p:spPr>
+          <a:xfrm>
+            <a:off x="1055688" y="1143000"/>
+            <a:ext cx="4746625" cy="3086100"/>
+          </a:xfrm>
+          <a:custGeom>
+            <a:avLst/>
+            <a:gdLst/>
+            <a:ahLst/>
+            <a:cxnLst/>
+            <a:rect l="0" t="0" r="0" b="0"/>
+            <a:pathLst>
+              <a:path w="120000" h="120000" extrusionOk="0">
+                <a:moveTo>
+                  <a:pt x="0" y="0"/>
+                </a:moveTo>
+                <a:lnTo>
+                  <a:pt x="120000" y="0"/>
+                </a:lnTo>
+                <a:lnTo>
+                  <a:pt x="120000" y="120000"/>
+                </a:lnTo>
+                <a:lnTo>
+                  <a:pt x="0" y="120000"/>
+                </a:lnTo>
+                <a:close/>
+              </a:path>
+            </a:pathLst>
+          </a:custGeom>
+        </p:spPr>
+      </p:sp>
+      <p:sp>
+        <p:nvSpPr>
+          <p:cNvPr id="110" name="Shape 110"/>
+          <p:cNvSpPr txBox="1">
+            <a:spLocks noGrp="1"/>
+          </p:cNvSpPr>
+          <p:nvPr>
+            <p:ph type="body" idx="1"/>
+          </p:nvPr>
+        </p:nvSpPr>
+        <p:spPr>
+          <a:xfrm>
+            <a:off x="685800" y="4400550"/>
+            <a:ext cx="5486400" cy="3600600"/>
+          </a:xfrm>
+          <a:prstGeom prst="rect">
+            <a:avLst/>
+          </a:prstGeom>
+        </p:spPr>
+        <p:txBody>
+          <a:bodyPr lIns="91425" tIns="91425" rIns="91425" bIns="91425" anchor="t" anchorCtr="0">
+            <a:noAutofit/>
+          </a:bodyPr>
+          <a:lstStyle/>
+          <a:p>
+            <a:pPr lvl="0" rtl="0">
+              <a:spcBef>
+                <a:spcPts val="0"/>
+              </a:spcBef>
+              <a:buNone/>
+            </a:pPr>
+            <a:endParaRPr/>
+          </a:p>
+        </p:txBody>
+      </p:sp>
+      <p:sp>
+        <p:nvSpPr>
+          <p:cNvPr id="111" name="Shape 111"/>
+          <p:cNvSpPr txBox="1">
+            <a:spLocks noGrp="1"/>
+          </p:cNvSpPr>
+          <p:nvPr>
+            <p:ph type="sldNum" idx="12"/>
+          </p:nvPr>
+        </p:nvSpPr>
+        <p:spPr>
+          <a:xfrm>
+            <a:off x="3884612" y="8685213"/>
+            <a:ext cx="2971800" cy="458700"/>
+          </a:xfrm>
+          <a:prstGeom prst="rect">
+            <a:avLst/>
+          </a:prstGeom>
+        </p:spPr>
+        <p:txBody>
+          <a:bodyPr lIns="91425" tIns="45700" rIns="91425" bIns="45700" anchor="b" anchorCtr="0">
+            <a:noAutofit/>
+          </a:bodyPr>
+          <a:lstStyle/>
+          <a:p>
+            <a:pPr lvl="0" rtl="0">
+              <a:spcBef>
+                <a:spcPts val="0"/>
+              </a:spcBef>
+              <a:buNone/>
+            </a:pPr>
+            <a:fld id="{00000000-1234-1234-1234-123412341234}" type="slidenum">
+              <a:rPr lang="en-US"/>
+              <a:t>12</a:t>
             </a:fld>
             <a:endParaRPr lang="en-US"/>
           </a:p>
@@ -12130,19 +12276,7 @@
                 <a:cs typeface="Times New Roman" charset="0"/>
                 <a:sym typeface="Calibri"/>
               </a:rPr>
-              <a:t>Team Members</a:t>
-            </a:r>
-            <a:r>
-              <a:rPr lang="en-US" sz="1800" b="0" i="0" u="none" strike="noStrike" cap="none" dirty="0" smtClean="0">
-                <a:solidFill>
-                  <a:schemeClr val="dk1"/>
-                </a:solidFill>
-                <a:latin typeface="Times New Roman" charset="0"/>
-                <a:ea typeface="Times New Roman" charset="0"/>
-                <a:cs typeface="Times New Roman" charset="0"/>
-                <a:sym typeface="Calibri"/>
-              </a:rPr>
-              <a:t>:</a:t>
+              <a:t>Team Members:</a:t>
             </a:r>
           </a:p>
           <a:p>
@@ -12188,6 +12322,18 @@
               <a:t>			</a:t>
             </a:r>
             <a:r>
+              <a:rPr lang="en-US" sz="1800" dirty="0" smtClean="0">
+                <a:solidFill>
+                  <a:schemeClr val="dk1"/>
+                </a:solidFill>
+                <a:latin typeface="Times New Roman" charset="0"/>
+                <a:ea typeface="Times New Roman" charset="0"/>
+                <a:cs typeface="Times New Roman" charset="0"/>
+                <a:sym typeface="Calibri"/>
+              </a:rPr>
+              <a:t>							</a:t>
+            </a:r>
+            <a:r>
               <a:rPr lang="en-US" sz="1800" b="0" i="0" u="none" strike="noStrike" cap="none" dirty="0" err="1" smtClean="0">
                 <a:solidFill>
                   <a:schemeClr val="dk1"/>
@@ -12260,6 +12406,18 @@
                 <a:sym typeface="Calibri"/>
               </a:rPr>
               <a:t>			     </a:t>
+            </a:r>
+            <a:r>
+              <a:rPr lang="en-US" sz="1800" b="0" i="0" u="none" strike="noStrike" cap="none" dirty="0" smtClean="0">
+                <a:solidFill>
+                  <a:schemeClr val="dk1"/>
+                </a:solidFill>
+                <a:latin typeface="Times New Roman" charset="0"/>
+                <a:ea typeface="Times New Roman" charset="0"/>
+                <a:cs typeface="Times New Roman" charset="0"/>
+                <a:sym typeface="Calibri"/>
+              </a:rPr>
+              <a:t>                                        </a:t>
             </a:r>
             <a:r>
               <a:rPr lang="en-US" sz="1800" b="0" i="0" u="none" strike="noStrike" cap="none" dirty="0" err="1" smtClean="0">
@@ -12614,7 +12772,7 @@
   <p:timing>
     <p:tnLst>
       <p:par>
-        <p:cTn id="1" dur="indefinite" restart="never" nodeType="tmRoot"/>
+        <p:cTn xmlns:p14="http://schemas.microsoft.com/office/powerpoint/2010/main" id="1" dur="indefinite" restart="never" nodeType="tmRoot"/>
       </p:par>
     </p:tnLst>
   </p:timing>
@@ -12828,15 +12986,7 @@
                 <a:ea typeface="Times New Roman" charset="0"/>
                 <a:cs typeface="Times New Roman" charset="0"/>
               </a:rPr>
-              <a:t>Special </a:t>
-            </a:r>
-            <a:r>
-              <a:rPr lang="en-US" sz="3200" dirty="0" smtClean="0">
-                <a:latin typeface="Times New Roman" charset="0"/>
-                <a:ea typeface="Times New Roman" charset="0"/>
-                <a:cs typeface="Times New Roman" charset="0"/>
-              </a:rPr>
-              <a:t>Purpose </a:t>
+              <a:t>Special Purpose </a:t>
             </a:r>
             <a:r>
               <a:rPr lang="en-US" sz="3200" dirty="0">
@@ -13165,7 +13315,7 @@
   <p:timing>
     <p:tnLst>
       <p:par>
-        <p:cTn id="1" dur="indefinite" restart="never" nodeType="tmRoot"/>
+        <p:cTn xmlns:p14="http://schemas.microsoft.com/office/powerpoint/2010/main" id="1" dur="indefinite" restart="never" nodeType="tmRoot"/>
       </p:par>
     </p:tnLst>
   </p:timing>
@@ -13339,6 +13489,549 @@
       </p:sp>
       <p:sp>
         <p:nvSpPr>
+          <p:cNvPr id="117" name="Shape 117"/>
+          <p:cNvSpPr/>
+          <p:nvPr/>
+        </p:nvSpPr>
+        <p:spPr>
+          <a:xfrm>
+            <a:off x="2037391" y="23560"/>
+            <a:ext cx="7106609" cy="778952"/>
+          </a:xfrm>
+          <a:prstGeom prst="rect">
+            <a:avLst/>
+          </a:prstGeom>
+          <a:noFill/>
+          <a:ln>
+            <a:noFill/>
+          </a:ln>
+        </p:spPr>
+        <p:txBody>
+          <a:bodyPr lIns="91425" tIns="45700" rIns="91425" bIns="45700" anchor="t" anchorCtr="0">
+            <a:noAutofit/>
+          </a:bodyPr>
+          <a:lstStyle/>
+          <a:p>
+            <a:pPr lvl="0" algn="ctr">
+              <a:buSzPct val="25000"/>
+            </a:pPr>
+            <a:r>
+              <a:rPr lang="en-US" sz="3200" dirty="0" smtClean="0">
+                <a:latin typeface="Times New Roman" charset="0"/>
+                <a:ea typeface="Times New Roman" charset="0"/>
+                <a:cs typeface="Times New Roman" charset="0"/>
+              </a:rPr>
+              <a:t>Laplace of Gaussian</a:t>
+            </a:r>
+          </a:p>
+          <a:p>
+            <a:pPr lvl="0" algn="ctr">
+              <a:buSzPct val="25000"/>
+            </a:pPr>
+            <a:endParaRPr lang="en-US" sz="3200" dirty="0">
+              <a:solidFill>
+                <a:schemeClr val="dk1"/>
+              </a:solidFill>
+              <a:latin typeface="Times New Roman" charset="0"/>
+              <a:ea typeface="Times New Roman" charset="0"/>
+              <a:cs typeface="Times New Roman" charset="0"/>
+              <a:sym typeface="Times New Roman"/>
+            </a:endParaRPr>
+          </a:p>
+        </p:txBody>
+      </p:sp>
+      <p:sp>
+        <p:nvSpPr>
+          <p:cNvPr id="118" name="Shape 118"/>
+          <p:cNvSpPr/>
+          <p:nvPr/>
+        </p:nvSpPr>
+        <p:spPr>
+          <a:xfrm>
+            <a:off x="474875" y="1483602"/>
+            <a:ext cx="8213400" cy="4035000"/>
+          </a:xfrm>
+          <a:prstGeom prst="rect">
+            <a:avLst/>
+          </a:prstGeom>
+          <a:noFill/>
+          <a:ln>
+            <a:noFill/>
+          </a:ln>
+        </p:spPr>
+        <p:txBody>
+          <a:bodyPr lIns="91425" tIns="45700" rIns="91425" bIns="45700" anchor="t" anchorCtr="0">
+            <a:noAutofit/>
+          </a:bodyPr>
+          <a:lstStyle/>
+          <a:p>
+            <a:pPr marL="0" marR="0" lvl="0" indent="0" algn="just" rtl="0">
+              <a:spcBef>
+                <a:spcPts val="0"/>
+              </a:spcBef>
+              <a:buNone/>
+            </a:pPr>
+            <a:endParaRPr sz="1800" b="0" i="0" u="none" strike="noStrike" cap="none" dirty="0">
+              <a:solidFill>
+                <a:schemeClr val="dk1"/>
+              </a:solidFill>
+              <a:latin typeface="Times New Roman" charset="0"/>
+              <a:ea typeface="Times New Roman" charset="0"/>
+              <a:cs typeface="Times New Roman" charset="0"/>
+              <a:sym typeface="Calibri"/>
+            </a:endParaRPr>
+          </a:p>
+          <a:p>
+            <a:pPr marL="0" marR="0" lvl="0" indent="0" algn="just" rtl="0">
+              <a:spcBef>
+                <a:spcPts val="0"/>
+              </a:spcBef>
+              <a:buNone/>
+            </a:pPr>
+            <a:endParaRPr sz="1800" b="0" i="0" u="none" strike="noStrike" cap="none" dirty="0">
+              <a:solidFill>
+                <a:schemeClr val="dk1"/>
+              </a:solidFill>
+              <a:latin typeface="Times New Roman" charset="0"/>
+              <a:ea typeface="Times New Roman" charset="0"/>
+              <a:cs typeface="Times New Roman" charset="0"/>
+              <a:sym typeface="Calibri"/>
+            </a:endParaRPr>
+          </a:p>
+        </p:txBody>
+      </p:sp>
+      <p:sp>
+        <p:nvSpPr>
+          <p:cNvPr id="2" name="TextBox 1"/>
+          <p:cNvSpPr txBox="1"/>
+          <p:nvPr/>
+        </p:nvSpPr>
+        <p:spPr>
+          <a:xfrm>
+            <a:off x="222422" y="802512"/>
+            <a:ext cx="8736227" cy="5632312"/>
+          </a:xfrm>
+          <a:prstGeom prst="rect">
+            <a:avLst/>
+          </a:prstGeom>
+          <a:noFill/>
+        </p:spPr>
+        <p:txBody>
+          <a:bodyPr wrap="square" rtlCol="0">
+            <a:spAutoFit/>
+          </a:bodyPr>
+          <a:lstStyle/>
+          <a:p>
+            <a:pPr marL="285750" indent="-285750">
+              <a:buFont typeface="Arial"/>
+              <a:buChar char="•"/>
+            </a:pPr>
+            <a:r>
+              <a:rPr lang="en-US" sz="1800" dirty="0" smtClean="0">
+                <a:latin typeface="Times New Roman"/>
+                <a:cs typeface="Times New Roman"/>
+              </a:rPr>
+              <a:t>Laplace of Gaussian filter is the leading data manipulation technique used in image processing to remove noise and other disturbances. </a:t>
+            </a:r>
+          </a:p>
+          <a:p>
+            <a:endParaRPr lang="en-US" sz="1800" dirty="0" smtClean="0">
+              <a:latin typeface="Times New Roman"/>
+              <a:cs typeface="Times New Roman"/>
+            </a:endParaRPr>
+          </a:p>
+          <a:p>
+            <a:pPr marL="285750" indent="-285750">
+              <a:buFont typeface="Arial"/>
+              <a:buChar char="•"/>
+            </a:pPr>
+            <a:r>
+              <a:rPr lang="en-US" sz="1800" dirty="0" smtClean="0">
+                <a:latin typeface="Times New Roman"/>
+                <a:cs typeface="Times New Roman"/>
+              </a:rPr>
+              <a:t>We take advantage of this technique to process and enhance the sensor data of our AGV, which greatly influences the overall operation. </a:t>
+            </a:r>
+          </a:p>
+          <a:p>
+            <a:endParaRPr lang="en-US" sz="1800" dirty="0" smtClean="0">
+              <a:latin typeface="Times New Roman"/>
+              <a:cs typeface="Times New Roman"/>
+            </a:endParaRPr>
+          </a:p>
+          <a:p>
+            <a:pPr marL="285750" indent="-285750">
+              <a:buFont typeface="Arial"/>
+              <a:buChar char="•"/>
+            </a:pPr>
+            <a:r>
+              <a:rPr lang="en-US" sz="1800" dirty="0" smtClean="0">
+                <a:latin typeface="Times New Roman"/>
+                <a:cs typeface="Times New Roman"/>
+              </a:rPr>
+              <a:t>Laplace of Gaussian is obtained by the double derivative of Gaussian function.</a:t>
+            </a:r>
+          </a:p>
+          <a:p>
+            <a:endParaRPr lang="en-US" sz="1800" dirty="0">
+              <a:latin typeface="Times New Roman"/>
+              <a:cs typeface="Times New Roman"/>
+            </a:endParaRPr>
+          </a:p>
+          <a:p>
+            <a:pPr marL="285750" indent="-285750">
+              <a:buFont typeface="Arial"/>
+              <a:buChar char="•"/>
+            </a:pPr>
+            <a:r>
+              <a:rPr lang="en-US" sz="1800" dirty="0" smtClean="0">
+                <a:latin typeface="Times New Roman"/>
+                <a:cs typeface="Times New Roman"/>
+              </a:rPr>
+              <a:t>The 1-D Gaussian function is as follows:</a:t>
+            </a:r>
+          </a:p>
+          <a:p>
+            <a:r>
+              <a:rPr lang="en-US" dirty="0"/>
+              <a:t> </a:t>
+            </a:r>
+            <a:r>
+              <a:rPr lang="en-US" dirty="0" smtClean="0"/>
+              <a:t> </a:t>
+            </a:r>
+          </a:p>
+          <a:p>
+            <a:r>
+              <a:rPr lang="en-US" dirty="0"/>
+              <a:t> </a:t>
+            </a:r>
+            <a:r>
+              <a:rPr lang="en-US" dirty="0" smtClean="0"/>
+              <a:t>                             </a:t>
+            </a:r>
+            <a:r>
+              <a:rPr lang="en-US" sz="2800" dirty="0" smtClean="0">
+                <a:latin typeface="Times New Roman"/>
+                <a:cs typeface="Times New Roman"/>
+              </a:rPr>
+              <a:t> </a:t>
+            </a:r>
+            <a:endParaRPr lang="en-US" sz="2800" i="1" baseline="30000" dirty="0">
+              <a:latin typeface="Times New Roman"/>
+              <a:cs typeface="Times New Roman"/>
+            </a:endParaRPr>
+          </a:p>
+          <a:p>
+            <a:endParaRPr lang="en-US" sz="2400" i="1" baseline="30000" dirty="0"/>
+          </a:p>
+          <a:p>
+            <a:pPr marL="285750" indent="-285750">
+              <a:buFont typeface="Arial"/>
+              <a:buChar char="•"/>
+            </a:pPr>
+            <a:r>
+              <a:rPr lang="en-US" sz="1800" dirty="0" smtClean="0">
+                <a:latin typeface="Times New Roman"/>
+                <a:cs typeface="Times New Roman"/>
+              </a:rPr>
+              <a:t>The Laplace of Gaussian function is as </a:t>
+            </a:r>
+            <a:r>
+              <a:rPr lang="en-US" sz="1800" dirty="0">
+                <a:latin typeface="Times New Roman"/>
+                <a:cs typeface="Times New Roman"/>
+              </a:rPr>
+              <a:t>follows</a:t>
+            </a:r>
+            <a:r>
+              <a:rPr lang="en-US" sz="1800" dirty="0" smtClean="0">
+                <a:latin typeface="Times New Roman"/>
+                <a:cs typeface="Times New Roman"/>
+              </a:rPr>
+              <a:t>:</a:t>
+            </a:r>
+          </a:p>
+          <a:p>
+            <a:endParaRPr lang="en-US" sz="1800" dirty="0">
+              <a:latin typeface="Times New Roman"/>
+              <a:cs typeface="Times New Roman"/>
+            </a:endParaRPr>
+          </a:p>
+          <a:p>
+            <a:r>
+              <a:rPr lang="en-US" sz="2400" dirty="0" smtClean="0"/>
+              <a:t>                  </a:t>
+            </a:r>
+            <a:endParaRPr lang="en-US" sz="2800" i="1" baseline="30000" dirty="0">
+              <a:latin typeface="Times New Roman"/>
+              <a:cs typeface="Times New Roman"/>
+            </a:endParaRPr>
+          </a:p>
+          <a:p>
+            <a:endParaRPr lang="en-US" sz="2400" i="1" dirty="0">
+              <a:latin typeface="Times New Roman"/>
+              <a:cs typeface="Times New Roman"/>
+            </a:endParaRPr>
+          </a:p>
+          <a:p>
+            <a:endParaRPr lang="en-US" sz="2400" i="1" baseline="30000" dirty="0" smtClean="0"/>
+          </a:p>
+          <a:p>
+            <a:endParaRPr lang="en-US" sz="2400" i="1" baseline="30000" dirty="0"/>
+          </a:p>
+          <a:p>
+            <a:endParaRPr lang="en-US" sz="2400" dirty="0"/>
+          </a:p>
+        </p:txBody>
+      </p:sp>
+      <p:pic>
+        <p:nvPicPr>
+          <p:cNvPr id="4" name="Picture 3" descr="Screen Shot 2016-11-04 at 10.06.09 PM.png"/>
+          <p:cNvPicPr>
+            <a:picLocks noChangeAspect="1"/>
+          </p:cNvPicPr>
+          <p:nvPr/>
+        </p:nvPicPr>
+        <p:blipFill>
+          <a:blip r:embed="rId4">
+            <a:extLst>
+              <a:ext uri="{28A0092B-C50C-407E-A947-70E740481C1C}">
+                <a14:useLocalDpi xmlns:a14="http://schemas.microsoft.com/office/drawing/2010/main" val="0"/>
+              </a:ext>
+            </a:extLst>
+          </a:blip>
+          <a:stretch>
+            <a:fillRect/>
+          </a:stretch>
+        </p:blipFill>
+        <p:spPr>
+          <a:xfrm>
+            <a:off x="2176930" y="3368039"/>
+            <a:ext cx="4584700" cy="574094"/>
+          </a:xfrm>
+          <a:prstGeom prst="rect">
+            <a:avLst/>
+          </a:prstGeom>
+        </p:spPr>
+      </p:pic>
+      <p:pic>
+        <p:nvPicPr>
+          <p:cNvPr id="6" name="Picture 5" descr="Screen Shot 2016-11-04 at 10.07.35 PM.png"/>
+          <p:cNvPicPr>
+            <a:picLocks noChangeAspect="1"/>
+          </p:cNvPicPr>
+          <p:nvPr/>
+        </p:nvPicPr>
+        <p:blipFill>
+          <a:blip r:embed="rId5">
+            <a:extLst>
+              <a:ext uri="{28A0092B-C50C-407E-A947-70E740481C1C}">
+                <a14:useLocalDpi xmlns:a14="http://schemas.microsoft.com/office/drawing/2010/main" val="0"/>
+              </a:ext>
+            </a:extLst>
+          </a:blip>
+          <a:stretch>
+            <a:fillRect/>
+          </a:stretch>
+        </p:blipFill>
+        <p:spPr>
+          <a:xfrm>
+            <a:off x="965200" y="4575789"/>
+            <a:ext cx="7493000" cy="622300"/>
+          </a:xfrm>
+          <a:prstGeom prst="rect">
+            <a:avLst/>
+          </a:prstGeom>
+        </p:spPr>
+      </p:pic>
+    </p:spTree>
+    <p:extLst>
+      <p:ext uri="{BB962C8B-B14F-4D97-AF65-F5344CB8AC3E}">
+        <p14:creationId xmlns:p14="http://schemas.microsoft.com/office/powerpoint/2010/main" val="3508250531"/>
+      </p:ext>
+    </p:extLst>
+  </p:cSld>
+  <p:clrMapOvr>
+    <a:masterClrMapping/>
+  </p:clrMapOvr>
+  <p:timing>
+    <p:tnLst>
+      <p:par>
+        <p:cTn xmlns:p14="http://schemas.microsoft.com/office/powerpoint/2010/main" id="1" dur="indefinite" restart="never" nodeType="tmRoot"/>
+      </p:par>
+    </p:tnLst>
+  </p:timing>
+</p:sld>
+</file>
+
+<file path=ppt/slides/slide12.xml><?xml version="1.0" encoding="utf-8"?>
+<p:sld xmlns:a="http://schemas.openxmlformats.org/drawingml/2006/main" xmlns:r="http://schemas.openxmlformats.org/officeDocument/2006/relationships" xmlns:p="http://schemas.openxmlformats.org/presentationml/2006/main">
+  <p:cSld>
+    <p:spTree>
+      <p:nvGrpSpPr>
+        <p:cNvPr id="1" name="Shape 112"/>
+        <p:cNvGrpSpPr/>
+        <p:nvPr/>
+      </p:nvGrpSpPr>
+      <p:grpSpPr>
+        <a:xfrm>
+          <a:off x="0" y="0"/>
+          <a:ext cx="0" cy="0"/>
+          <a:chOff x="0" y="0"/>
+          <a:chExt cx="0" cy="0"/>
+        </a:xfrm>
+      </p:grpSpPr>
+      <p:sp>
+        <p:nvSpPr>
+          <p:cNvPr id="113" name="Shape 113"/>
+          <p:cNvSpPr txBox="1">
+            <a:spLocks noGrp="1"/>
+          </p:cNvSpPr>
+          <p:nvPr>
+            <p:ph type="ctrTitle"/>
+          </p:nvPr>
+        </p:nvSpPr>
+        <p:spPr>
+          <a:xfrm>
+            <a:off x="685800" y="1846368"/>
+            <a:ext cx="7772400" cy="1274100"/>
+          </a:xfrm>
+          <a:prstGeom prst="rect">
+            <a:avLst/>
+          </a:prstGeom>
+        </p:spPr>
+        <p:txBody>
+          <a:bodyPr lIns="91425" tIns="91425" rIns="91425" bIns="91425" anchor="ctr" anchorCtr="0">
+            <a:noAutofit/>
+          </a:bodyPr>
+          <a:lstStyle/>
+          <a:p>
+            <a:pPr lvl="0" rtl="0">
+              <a:spcBef>
+                <a:spcPts val="0"/>
+              </a:spcBef>
+              <a:buNone/>
+            </a:pPr>
+            <a:endParaRPr/>
+          </a:p>
+        </p:txBody>
+      </p:sp>
+      <p:sp>
+        <p:nvSpPr>
+          <p:cNvPr id="114" name="Shape 114"/>
+          <p:cNvSpPr txBox="1">
+            <a:spLocks noGrp="1"/>
+          </p:cNvSpPr>
+          <p:nvPr>
+            <p:ph type="subTitle" idx="1"/>
+          </p:nvPr>
+        </p:nvSpPr>
+        <p:spPr>
+          <a:xfrm>
+            <a:off x="1371600" y="3368039"/>
+            <a:ext cx="6400800" cy="1518900"/>
+          </a:xfrm>
+          <a:prstGeom prst="rect">
+            <a:avLst/>
+          </a:prstGeom>
+        </p:spPr>
+        <p:txBody>
+          <a:bodyPr lIns="91425" tIns="91425" rIns="91425" bIns="91425" anchor="t" anchorCtr="0">
+            <a:noAutofit/>
+          </a:bodyPr>
+          <a:lstStyle/>
+          <a:p>
+            <a:pPr lvl="0" rtl="0">
+              <a:spcBef>
+                <a:spcPts val="0"/>
+              </a:spcBef>
+              <a:buNone/>
+            </a:pPr>
+            <a:endParaRPr/>
+          </a:p>
+        </p:txBody>
+      </p:sp>
+      <p:pic>
+        <p:nvPicPr>
+          <p:cNvPr id="115" name="Shape 115"/>
+          <p:cNvPicPr preferRelativeResize="0"/>
+          <p:nvPr/>
+        </p:nvPicPr>
+        <p:blipFill rotWithShape="1">
+          <a:blip r:embed="rId3">
+            <a:alphaModFix/>
+          </a:blip>
+          <a:srcRect/>
+          <a:stretch/>
+        </p:blipFill>
+        <p:spPr>
+          <a:xfrm>
+            <a:off x="19027" y="0"/>
+            <a:ext cx="9125100" cy="5943600"/>
+          </a:xfrm>
+          <a:prstGeom prst="rect">
+            <a:avLst/>
+          </a:prstGeom>
+          <a:noFill/>
+          <a:ln>
+            <a:noFill/>
+          </a:ln>
+        </p:spPr>
+      </p:pic>
+      <p:sp>
+        <p:nvSpPr>
+          <p:cNvPr id="116" name="Shape 116"/>
+          <p:cNvSpPr txBox="1"/>
+          <p:nvPr/>
+        </p:nvSpPr>
+        <p:spPr>
+          <a:xfrm>
+            <a:off x="2736316" y="113905"/>
+            <a:ext cx="5066700" cy="490200"/>
+          </a:xfrm>
+          <a:prstGeom prst="rect">
+            <a:avLst/>
+          </a:prstGeom>
+          <a:noFill/>
+          <a:ln>
+            <a:noFill/>
+          </a:ln>
+        </p:spPr>
+        <p:txBody>
+          <a:bodyPr lIns="91425" tIns="45700" rIns="91425" bIns="45700" anchor="ctr" anchorCtr="0">
+            <a:noAutofit/>
+          </a:bodyPr>
+          <a:lstStyle/>
+          <a:p>
+            <a:pPr marL="0" marR="0" lvl="0" indent="0" algn="l" rtl="0">
+              <a:spcBef>
+                <a:spcPts val="0"/>
+              </a:spcBef>
+              <a:buClr>
+                <a:schemeClr val="lt1"/>
+              </a:buClr>
+              <a:buSzPct val="25000"/>
+              <a:buFont typeface="Arial"/>
+              <a:buNone/>
+            </a:pPr>
+            <a:r>
+              <a:rPr lang="en-US" sz="1600" b="0" i="0" u="none" strike="noStrike" cap="none">
+                <a:solidFill>
+                  <a:schemeClr val="lt1"/>
+                </a:solidFill>
+                <a:latin typeface="Arial"/>
+                <a:ea typeface="Arial"/>
+                <a:cs typeface="Arial"/>
+                <a:sym typeface="Arial"/>
+              </a:rPr>
+              <a:t>SJSU Washington Square </a:t>
+            </a:r>
+          </a:p>
+        </p:txBody>
+      </p:sp>
+      <p:sp>
+        <p:nvSpPr>
           <p:cNvPr id="118" name="Shape 118"/>
           <p:cNvSpPr/>
           <p:nvPr/>
@@ -13449,7 +14142,7 @@
   <p:timing>
     <p:tnLst>
       <p:par>
-        <p:cTn id="1" dur="indefinite" restart="never" nodeType="tmRoot"/>
+        <p:cTn xmlns:p14="http://schemas.microsoft.com/office/powerpoint/2010/main" id="1" dur="indefinite" restart="never" nodeType="tmRoot"/>
       </p:par>
     </p:tnLst>
   </p:timing>
@@ -13978,7 +14671,7 @@
   <p:timing>
     <p:tnLst>
       <p:par>
-        <p:cTn id="1" dur="indefinite" restart="never" nodeType="tmRoot"/>
+        <p:cTn xmlns:p14="http://schemas.microsoft.com/office/powerpoint/2010/main" id="1" dur="indefinite" restart="never" nodeType="tmRoot"/>
       </p:par>
     </p:tnLst>
   </p:timing>
@@ -14573,7 +15266,7 @@
   <p:timing>
     <p:tnLst>
       <p:par>
-        <p:cTn id="1" dur="indefinite" restart="never" nodeType="tmRoot"/>
+        <p:cTn xmlns:p14="http://schemas.microsoft.com/office/powerpoint/2010/main" id="1" dur="indefinite" restart="never" nodeType="tmRoot"/>
       </p:par>
     </p:tnLst>
   </p:timing>
@@ -15022,19 +15715,7 @@
                 <a:cs typeface="Times New Roman" charset="0"/>
                 <a:sym typeface="Calibri"/>
               </a:rPr>
-              <a:t>Input </a:t>
-            </a:r>
-            <a:r>
-              <a:rPr lang="en-US" dirty="0" smtClean="0">
-                <a:solidFill>
-                  <a:schemeClr val="dk1"/>
-                </a:solidFill>
-                <a:latin typeface="Times New Roman" charset="0"/>
-                <a:ea typeface="Times New Roman" charset="0"/>
-                <a:cs typeface="Times New Roman" charset="0"/>
-                <a:sym typeface="Calibri"/>
-              </a:rPr>
-              <a:t>voltage </a:t>
+              <a:t>Input voltage </a:t>
             </a:r>
             <a:r>
               <a:rPr lang="en-US" dirty="0">
@@ -15183,19 +15864,7 @@
                 <a:cs typeface="Times New Roman" charset="0"/>
                 <a:sym typeface="Calibri"/>
               </a:rPr>
-              <a:t>analog </a:t>
-            </a:r>
-            <a:r>
-              <a:rPr lang="en-US" dirty="0" smtClean="0">
-                <a:solidFill>
-                  <a:schemeClr val="dk1"/>
-                </a:solidFill>
-                <a:latin typeface="Times New Roman" charset="0"/>
-                <a:ea typeface="Times New Roman" charset="0"/>
-                <a:cs typeface="Times New Roman" charset="0"/>
-                <a:sym typeface="Calibri"/>
-              </a:rPr>
-              <a:t>signal on Pin 4 </a:t>
+              <a:t>analog signal on Pin 4 </a:t>
             </a:r>
             <a:r>
               <a:rPr lang="en-US" dirty="0">
@@ -15457,7 +16126,7 @@
   <p:timing>
     <p:tnLst>
       <p:par>
-        <p:cTn id="1" dur="indefinite" restart="never" nodeType="tmRoot"/>
+        <p:cTn xmlns:p14="http://schemas.microsoft.com/office/powerpoint/2010/main" id="1" dur="indefinite" restart="never" nodeType="tmRoot"/>
       </p:par>
     </p:tnLst>
   </p:timing>
@@ -15709,15 +16378,7 @@
                 <a:ea typeface="Times New Roman" charset="0"/>
                 <a:cs typeface="Times New Roman" charset="0"/>
               </a:rPr>
-              <a:t>Magnetic </a:t>
-            </a:r>
-            <a:r>
-              <a:rPr lang="en-US" sz="3200" dirty="0" smtClean="0">
-                <a:latin typeface="Times New Roman" charset="0"/>
-                <a:ea typeface="Times New Roman" charset="0"/>
-                <a:cs typeface="Times New Roman" charset="0"/>
-              </a:rPr>
-              <a:t>Pin-Out</a:t>
+              <a:t>Magnetic Pin-Out</a:t>
             </a:r>
             <a:endParaRPr lang="en-US" sz="3200" dirty="0">
               <a:solidFill>
@@ -15898,7 +16559,7 @@
   <p:timing>
     <p:tnLst>
       <p:par>
-        <p:cTn id="1" dur="indefinite" restart="never" nodeType="tmRoot"/>
+        <p:cTn xmlns:p14="http://schemas.microsoft.com/office/powerpoint/2010/main" id="1" dur="indefinite" restart="never" nodeType="tmRoot"/>
       </p:par>
     </p:tnLst>
   </p:timing>
@@ -16754,7 +17415,7 @@
   <p:timing>
     <p:tnLst>
       <p:par>
-        <p:cTn id="1" dur="indefinite" restart="never" nodeType="tmRoot"/>
+        <p:cTn xmlns:p14="http://schemas.microsoft.com/office/powerpoint/2010/main" id="1" dur="indefinite" restart="never" nodeType="tmRoot"/>
       </p:par>
     </p:tnLst>
   </p:timing>
@@ -17471,7 +18132,7 @@
   <p:timing>
     <p:tnLst>
       <p:par>
-        <p:cTn id="1" dur="indefinite" restart="never" nodeType="tmRoot"/>
+        <p:cTn xmlns:p14="http://schemas.microsoft.com/office/powerpoint/2010/main" id="1" dur="indefinite" restart="never" nodeType="tmRoot"/>
       </p:par>
     </p:tnLst>
   </p:timing>
@@ -18529,7 +19190,7 @@
   <p:timing>
     <p:tnLst>
       <p:par>
-        <p:cTn id="1" dur="indefinite" restart="never" nodeType="tmRoot"/>
+        <p:cTn xmlns:p14="http://schemas.microsoft.com/office/powerpoint/2010/main" id="1" dur="indefinite" restart="never" nodeType="tmRoot"/>
       </p:par>
     </p:tnLst>
   </p:timing>
@@ -18735,15 +19396,7 @@
                 <a:ea typeface="Times New Roman" charset="0"/>
                 <a:cs typeface="Times New Roman" charset="0"/>
               </a:rPr>
-              <a:t>LPC1769 ADC </a:t>
-            </a:r>
-            <a:r>
-              <a:rPr lang="en-US" sz="3200" dirty="0">
-                <a:latin typeface="Times New Roman" charset="0"/>
-                <a:ea typeface="Times New Roman" charset="0"/>
-                <a:cs typeface="Times New Roman" charset="0"/>
-              </a:rPr>
-              <a:t>P</a:t>
+              <a:t>LPC1769 ADC P</a:t>
             </a:r>
             <a:r>
               <a:rPr lang="en-US" sz="3200" dirty="0" smtClean="0">
@@ -18915,6 +19568,50 @@
               </a:rPr>
               <a:t>Initialize the ADC controller*/</a:t>
             </a:r>
+          </a:p>
+          <a:p>
+            <a:r>
+              <a:rPr lang="en-US" dirty="0">
+                <a:latin typeface="Times New Roman" charset="0"/>
+                <a:ea typeface="Times New Roman" charset="0"/>
+                <a:cs typeface="Times New Roman" charset="0"/>
+              </a:rPr>
+              <a:t>     </a:t>
+            </a:r>
+            <a:r>
+              <a:rPr lang="en-US" dirty="0" smtClean="0">
+                <a:latin typeface="Times New Roman" charset="0"/>
+                <a:ea typeface="Times New Roman" charset="0"/>
+                <a:cs typeface="Times New Roman" charset="0"/>
+              </a:rPr>
+              <a:t>	</a:t>
+            </a:r>
+            <a:r>
+              <a:rPr lang="en-US" dirty="0">
+                <a:latin typeface="Times New Roman" charset="0"/>
+                <a:ea typeface="Times New Roman" charset="0"/>
+                <a:cs typeface="Times New Roman" charset="0"/>
+              </a:rPr>
+              <a:t> </a:t>
+            </a:r>
+            <a:r>
+              <a:rPr lang="en-US" dirty="0" err="1">
+                <a:latin typeface="Times New Roman" charset="0"/>
+                <a:ea typeface="Times New Roman" charset="0"/>
+                <a:cs typeface="Times New Roman" charset="0"/>
+              </a:rPr>
+              <a:t>InitADC</a:t>
+            </a:r>
+            <a:r>
+              <a:rPr lang="en-US" dirty="0">
+                <a:latin typeface="Times New Roman" charset="0"/>
+                <a:ea typeface="Times New Roman" charset="0"/>
+                <a:cs typeface="Times New Roman" charset="0"/>
+              </a:rPr>
+              <a:t>();</a:t>
+            </a:r>
+          </a:p>
+          <a:p>
             <a:endParaRPr lang="en-US" dirty="0">
               <a:latin typeface="Times New Roman" charset="0"/>
               <a:ea typeface="Times New Roman" charset="0"/>
@@ -18928,69 +19625,7 @@
                 <a:ea typeface="Times New Roman" charset="0"/>
                 <a:cs typeface="Times New Roman" charset="0"/>
               </a:rPr>
-              <a:t>     </a:t>
-            </a:r>
-            <a:r>
-              <a:rPr lang="en-US" dirty="0" smtClean="0">
-                <a:latin typeface="Times New Roman" charset="0"/>
-                <a:ea typeface="Times New Roman" charset="0"/>
-                <a:cs typeface="Times New Roman" charset="0"/>
-              </a:rPr>
-              <a:t>	</a:t>
-            </a:r>
-            <a:r>
-              <a:rPr lang="en-US" dirty="0">
-                <a:latin typeface="Times New Roman" charset="0"/>
-                <a:ea typeface="Times New Roman" charset="0"/>
-                <a:cs typeface="Times New Roman" charset="0"/>
-              </a:rPr>
-              <a:t> </a:t>
-            </a:r>
-            <a:r>
-              <a:rPr lang="en-US" dirty="0" err="1">
-                <a:latin typeface="Times New Roman" charset="0"/>
-                <a:ea typeface="Times New Roman" charset="0"/>
-                <a:cs typeface="Times New Roman" charset="0"/>
-              </a:rPr>
-              <a:t>InitADC</a:t>
-            </a:r>
-            <a:r>
-              <a:rPr lang="en-US" dirty="0">
-                <a:latin typeface="Times New Roman" charset="0"/>
-                <a:ea typeface="Times New Roman" charset="0"/>
-                <a:cs typeface="Times New Roman" charset="0"/>
-              </a:rPr>
-              <a:t>();</a:t>
-            </a:r>
-            <a:endParaRPr lang="en-US" dirty="0">
-              <a:latin typeface="Times New Roman" charset="0"/>
-              <a:ea typeface="Times New Roman" charset="0"/>
-              <a:cs typeface="Times New Roman" charset="0"/>
-            </a:endParaRPr>
-          </a:p>
-          <a:p>
-            <a:endParaRPr lang="en-US" dirty="0">
-              <a:latin typeface="Times New Roman" charset="0"/>
-              <a:ea typeface="Times New Roman" charset="0"/>
-              <a:cs typeface="Times New Roman" charset="0"/>
-            </a:endParaRPr>
-          </a:p>
-          <a:p>
-            <a:r>
-              <a:rPr lang="en-US" dirty="0">
-                <a:latin typeface="Times New Roman" charset="0"/>
-                <a:ea typeface="Times New Roman" charset="0"/>
-                <a:cs typeface="Times New Roman" charset="0"/>
-              </a:rPr>
-              <a:t>2) </a:t>
-            </a:r>
-            <a:r>
-              <a:rPr lang="en-US" dirty="0">
-                <a:latin typeface="Times New Roman" charset="0"/>
-                <a:ea typeface="Times New Roman" charset="0"/>
-                <a:cs typeface="Times New Roman" charset="0"/>
-              </a:rPr>
-              <a:t>Data Acquisition</a:t>
+              <a:t>2) Data Acquisition</a:t>
             </a:r>
           </a:p>
           <a:p>
@@ -19032,11 +19667,6 @@
               </a:rPr>
               <a:t>Start ADC conversion*/</a:t>
             </a:r>
-            <a:endParaRPr lang="en-US" dirty="0">
-              <a:latin typeface="Times New Roman" charset="0"/>
-              <a:ea typeface="Times New Roman" charset="0"/>
-              <a:cs typeface="Times New Roman" charset="0"/>
-            </a:endParaRPr>
           </a:p>
           <a:p>
             <a:r>
@@ -19349,7 +19979,7 @@
   <p:timing>
     <p:tnLst>
       <p:par>
-        <p:cTn id="1" dur="indefinite" restart="never" nodeType="tmRoot"/>
+        <p:cTn xmlns:p14="http://schemas.microsoft.com/office/powerpoint/2010/main" id="1" dur="indefinite" restart="never" nodeType="tmRoot"/>
       </p:par>
     </p:tnLst>
   </p:timing>

</xml_diff>